<commit_message>
Revised and made changes to report
</commit_message>
<xml_diff>
--- a/Presentation/Stage_1/stage_1_report_ppt.pptx
+++ b/Presentation/Stage_1/stage_1_report_ppt.pptx
@@ -233,7 +233,7 @@
           <a:p>
             <a:fld id="{19E9FF76-C062-4226-8AB8-EBF09B6EF851}" type="datetimeFigureOut">
               <a:rPr lang="en-US" smtClean="0"/>
-              <a:t>12/30/2020</a:t>
+              <a:t>4/23/2021</a:t>
             </a:fld>
             <a:endParaRPr lang="en-US"/>
           </a:p>
@@ -399,7 +399,7 @@
             <a:fld id="{0BBD297E-FD4D-4C2A-B621-7DD1D6ED2429}" type="datetimeFigureOut">
               <a:rPr lang="en-US" smtClean="0"/>
               <a:pPr/>
-              <a:t>12/30/2020</a:t>
+              <a:t>4/23/2021</a:t>
             </a:fld>
             <a:endParaRPr lang="en-US"/>
           </a:p>
@@ -844,7 +844,7 @@
             <a:fld id="{4902B526-B4A4-4D4F-A7F5-CE68AFE2761B}" type="datetime1">
               <a:rPr lang="en-US" smtClean="0"/>
               <a:pPr/>
-              <a:t>12/30/2020</a:t>
+              <a:t>4/23/2021</a:t>
             </a:fld>
             <a:endParaRPr lang="en-US"/>
           </a:p>
@@ -1012,7 +1012,7 @@
             <a:fld id="{F8A82F0B-0335-46AB-8C73-2F806B1050A9}" type="datetime1">
               <a:rPr lang="en-US" smtClean="0"/>
               <a:pPr/>
-              <a:t>12/30/2020</a:t>
+              <a:t>4/23/2021</a:t>
             </a:fld>
             <a:endParaRPr lang="en-US"/>
           </a:p>
@@ -1190,7 +1190,7 @@
             <a:fld id="{6C4EF07B-4AD1-48C7-B71E-AF2A9A647295}" type="datetime1">
               <a:rPr lang="en-US" smtClean="0"/>
               <a:pPr/>
-              <a:t>12/30/2020</a:t>
+              <a:t>4/23/2021</a:t>
             </a:fld>
             <a:endParaRPr lang="en-US"/>
           </a:p>
@@ -1358,7 +1358,7 @@
             <a:fld id="{37EC93DC-A9AD-4A65-9F65-BBF7285F278B}" type="datetime1">
               <a:rPr lang="en-US" smtClean="0"/>
               <a:pPr/>
-              <a:t>12/30/2020</a:t>
+              <a:t>4/23/2021</a:t>
             </a:fld>
             <a:endParaRPr lang="en-US"/>
           </a:p>
@@ -1603,7 +1603,7 @@
             <a:fld id="{B67D333D-26AB-481E-AB5C-416565B2F5B3}" type="datetime1">
               <a:rPr lang="en-US" smtClean="0"/>
               <a:pPr/>
-              <a:t>12/30/2020</a:t>
+              <a:t>4/23/2021</a:t>
             </a:fld>
             <a:endParaRPr lang="en-US"/>
           </a:p>
@@ -1888,7 +1888,7 @@
             <a:fld id="{655BF409-CA11-43A2-B896-FC3A68C07721}" type="datetime1">
               <a:rPr lang="en-US" smtClean="0"/>
               <a:pPr/>
-              <a:t>12/30/2020</a:t>
+              <a:t>4/23/2021</a:t>
             </a:fld>
             <a:endParaRPr lang="en-US"/>
           </a:p>
@@ -2307,7 +2307,7 @@
             <a:fld id="{E005122B-FDF9-40D7-9DA0-667027396C14}" type="datetime1">
               <a:rPr lang="en-US" smtClean="0"/>
               <a:pPr/>
-              <a:t>12/30/2020</a:t>
+              <a:t>4/23/2021</a:t>
             </a:fld>
             <a:endParaRPr lang="en-US"/>
           </a:p>
@@ -2424,7 +2424,7 @@
             <a:fld id="{CA684C4E-E962-4BF9-A285-03C617E271B9}" type="datetime1">
               <a:rPr lang="en-US" smtClean="0"/>
               <a:pPr/>
-              <a:t>12/30/2020</a:t>
+              <a:t>4/23/2021</a:t>
             </a:fld>
             <a:endParaRPr lang="en-US"/>
           </a:p>
@@ -2519,7 +2519,7 @@
             <a:fld id="{AE57AF8E-D1AB-4ACB-8529-7279238D2DF9}" type="datetime1">
               <a:rPr lang="en-US" smtClean="0"/>
               <a:pPr/>
-              <a:t>12/30/2020</a:t>
+              <a:t>4/23/2021</a:t>
             </a:fld>
             <a:endParaRPr lang="en-US"/>
           </a:p>
@@ -2794,7 +2794,7 @@
             <a:fld id="{41A2AA29-7513-42C0-AED3-661268D79978}" type="datetime1">
               <a:rPr lang="en-US" smtClean="0"/>
               <a:pPr/>
-              <a:t>12/30/2020</a:t>
+              <a:t>4/23/2021</a:t>
             </a:fld>
             <a:endParaRPr lang="en-US"/>
           </a:p>
@@ -3046,7 +3046,7 @@
             <a:fld id="{596F0047-1322-4929-9AB1-D08E3C5114E6}" type="datetime1">
               <a:rPr lang="en-US" smtClean="0"/>
               <a:pPr/>
-              <a:t>12/30/2020</a:t>
+              <a:t>4/23/2021</a:t>
             </a:fld>
             <a:endParaRPr lang="en-US"/>
           </a:p>
@@ -3257,7 +3257,7 @@
             <a:fld id="{22C44988-1C4B-412E-849A-C0F3A3702D8F}" type="datetime1">
               <a:rPr lang="en-US" smtClean="0"/>
               <a:pPr/>
-              <a:t>12/30/2020</a:t>
+              <a:t>4/23/2021</a:t>
             </a:fld>
             <a:endParaRPr lang="en-US"/>
           </a:p>
@@ -4152,7 +4152,7 @@
             <a:fld id="{37EC93DC-A9AD-4A65-9F65-BBF7285F278B}" type="datetime1">
               <a:rPr lang="en-US" smtClean="0"/>
               <a:pPr/>
-              <a:t>12/30/2020</a:t>
+              <a:t>4/23/2021</a:t>
             </a:fld>
             <a:endParaRPr lang="en-US"/>
           </a:p>
@@ -4300,7 +4300,7 @@
             <a:fld id="{37EC93DC-A9AD-4A65-9F65-BBF7285F278B}" type="datetime1">
               <a:rPr lang="en-US" smtClean="0"/>
               <a:pPr/>
-              <a:t>12/30/2020</a:t>
+              <a:t>4/23/2021</a:t>
             </a:fld>
             <a:endParaRPr lang="en-US"/>
           </a:p>
@@ -4454,7 +4454,7 @@
             <a:fld id="{37EC93DC-A9AD-4A65-9F65-BBF7285F278B}" type="datetime1">
               <a:rPr lang="en-US" smtClean="0"/>
               <a:pPr/>
-              <a:t>12/30/2020</a:t>
+              <a:t>4/23/2021</a:t>
             </a:fld>
             <a:endParaRPr lang="en-US"/>
           </a:p>
@@ -4709,7 +4709,7 @@
             <a:fld id="{37EC93DC-A9AD-4A65-9F65-BBF7285F278B}" type="datetime1">
               <a:rPr lang="en-US" smtClean="0"/>
               <a:pPr/>
-              <a:t>12/30/2020</a:t>
+              <a:t>4/23/2021</a:t>
             </a:fld>
             <a:endParaRPr lang="en-US"/>
           </a:p>
@@ -4868,7 +4868,7 @@
             <a:fld id="{37EC93DC-A9AD-4A65-9F65-BBF7285F278B}" type="datetime1">
               <a:rPr lang="en-US" smtClean="0"/>
               <a:pPr/>
-              <a:t>12/30/2020</a:t>
+              <a:t>4/23/2021</a:t>
             </a:fld>
             <a:endParaRPr lang="en-US"/>
           </a:p>
@@ -4992,7 +4992,7 @@
             <a:fld id="{37EC93DC-A9AD-4A65-9F65-BBF7285F278B}" type="datetime1">
               <a:rPr lang="en-US" smtClean="0"/>
               <a:pPr/>
-              <a:t>12/30/2020</a:t>
+              <a:t>4/23/2021</a:t>
             </a:fld>
             <a:endParaRPr lang="en-US"/>
           </a:p>
@@ -5202,7 +5202,7 @@
             </a:pPr>
             <a:r>
               <a:rPr lang="en-US" dirty="0"/>
-              <a:t>- Data Scraping</a:t>
+              <a:t>-   Data Scraping</a:t>
             </a:r>
           </a:p>
           <a:p>
@@ -5212,7 +5212,7 @@
             </a:pPr>
             <a:r>
               <a:rPr lang="en-US" dirty="0"/>
-              <a:t>Data Cleaning</a:t>
+              <a:t> Data Cleaning</a:t>
             </a:r>
           </a:p>
           <a:p>
@@ -5265,7 +5265,7 @@
             <a:fld id="{37EC93DC-A9AD-4A65-9F65-BBF7285F278B}" type="datetime1">
               <a:rPr lang="en-US" smtClean="0"/>
               <a:pPr/>
-              <a:t>12/30/2020</a:t>
+              <a:t>4/23/2021</a:t>
             </a:fld>
             <a:endParaRPr lang="en-US"/>
           </a:p>
@@ -5433,7 +5433,7 @@
             <a:fld id="{37EC93DC-A9AD-4A65-9F65-BBF7285F278B}" type="datetime1">
               <a:rPr lang="en-US" smtClean="0"/>
               <a:pPr/>
-              <a:t>12/30/2020</a:t>
+              <a:t>4/23/2021</a:t>
             </a:fld>
             <a:endParaRPr lang="en-US"/>
           </a:p>
@@ -5581,7 +5581,7 @@
             <a:fld id="{37EC93DC-A9AD-4A65-9F65-BBF7285F278B}" type="datetime1">
               <a:rPr lang="en-US" smtClean="0"/>
               <a:pPr/>
-              <a:t>12/30/2020</a:t>
+              <a:t>4/23/2021</a:t>
             </a:fld>
             <a:endParaRPr lang="en-US"/>
           </a:p>
@@ -5739,7 +5739,7 @@
             <a:fld id="{37EC93DC-A9AD-4A65-9F65-BBF7285F278B}" type="datetime1">
               <a:rPr lang="en-US" smtClean="0"/>
               <a:pPr/>
-              <a:t>12/30/2020</a:t>
+              <a:t>4/23/2021</a:t>
             </a:fld>
             <a:endParaRPr lang="en-US"/>
           </a:p>
@@ -5908,7 +5908,7 @@
             <a:fld id="{EB04CD12-7626-4E20-998F-9DD6365721E6}" type="datetime1">
               <a:rPr lang="en-US" smtClean="0"/>
               <a:pPr/>
-              <a:t>12/30/2020</a:t>
+              <a:t>4/23/2021</a:t>
             </a:fld>
             <a:endParaRPr lang="en-US" dirty="0"/>
           </a:p>
@@ -6043,7 +6043,7 @@
             <a:fld id="{37EC93DC-A9AD-4A65-9F65-BBF7285F278B}" type="datetime1">
               <a:rPr lang="en-US" smtClean="0"/>
               <a:pPr/>
-              <a:t>12/30/2020</a:t>
+              <a:t>4/23/2021</a:t>
             </a:fld>
             <a:endParaRPr lang="en-US"/>
           </a:p>
@@ -6250,7 +6250,7 @@
             <a:fld id="{37EC93DC-A9AD-4A65-9F65-BBF7285F278B}" type="datetime1">
               <a:rPr lang="en-US" smtClean="0"/>
               <a:pPr/>
-              <a:t>12/30/2020</a:t>
+              <a:t>4/23/2021</a:t>
             </a:fld>
             <a:endParaRPr lang="en-US"/>
           </a:p>
@@ -6397,7 +6397,7 @@
             <a:fld id="{37EC93DC-A9AD-4A65-9F65-BBF7285F278B}" type="datetime1">
               <a:rPr lang="en-US" smtClean="0"/>
               <a:pPr/>
-              <a:t>12/30/2020</a:t>
+              <a:t>4/23/2021</a:t>
             </a:fld>
             <a:endParaRPr lang="en-US"/>
           </a:p>
@@ -6554,7 +6554,7 @@
             <a:fld id="{37EC93DC-A9AD-4A65-9F65-BBF7285F278B}" type="datetime1">
               <a:rPr lang="en-US" smtClean="0"/>
               <a:pPr/>
-              <a:t>12/30/2020</a:t>
+              <a:t>4/23/2021</a:t>
             </a:fld>
             <a:endParaRPr lang="en-US"/>
           </a:p>
@@ -6736,7 +6736,7 @@
             <a:fld id="{37EC93DC-A9AD-4A65-9F65-BBF7285F278B}" type="datetime1">
               <a:rPr lang="en-US" smtClean="0"/>
               <a:pPr/>
-              <a:t>12/30/2020</a:t>
+              <a:t>4/23/2021</a:t>
             </a:fld>
             <a:endParaRPr lang="en-US"/>
           </a:p>
@@ -6824,7 +6824,7 @@
             <a:fld id="{37EC93DC-A9AD-4A65-9F65-BBF7285F278B}" type="datetime1">
               <a:rPr lang="en-US" smtClean="0"/>
               <a:pPr/>
-              <a:t>12/30/2020</a:t>
+              <a:t>4/23/2021</a:t>
             </a:fld>
             <a:endParaRPr lang="en-US" dirty="0"/>
           </a:p>
@@ -6978,7 +6978,7 @@
             <a:fld id="{37EC93DC-A9AD-4A65-9F65-BBF7285F278B}" type="datetime1">
               <a:rPr lang="en-US" smtClean="0"/>
               <a:pPr/>
-              <a:t>12/30/2020</a:t>
+              <a:t>4/23/2021</a:t>
             </a:fld>
             <a:endParaRPr lang="en-US"/>
           </a:p>
@@ -7096,7 +7096,7 @@
             <a:fld id="{37EC93DC-A9AD-4A65-9F65-BBF7285F278B}" type="datetime1">
               <a:rPr lang="en-US" smtClean="0"/>
               <a:pPr/>
-              <a:t>12/30/2020</a:t>
+              <a:t>4/23/2021</a:t>
             </a:fld>
             <a:endParaRPr lang="en-US"/>
           </a:p>
@@ -7214,7 +7214,7 @@
             <a:fld id="{37EC93DC-A9AD-4A65-9F65-BBF7285F278B}" type="datetime1">
               <a:rPr lang="en-US" smtClean="0"/>
               <a:pPr/>
-              <a:t>12/30/2020</a:t>
+              <a:t>4/23/2021</a:t>
             </a:fld>
             <a:endParaRPr lang="en-US"/>
           </a:p>
@@ -7402,7 +7402,7 @@
             <a:fld id="{37EC93DC-A9AD-4A65-9F65-BBF7285F278B}" type="datetime1">
               <a:rPr lang="en-US" smtClean="0"/>
               <a:pPr/>
-              <a:t>12/30/2020</a:t>
+              <a:t>4/23/2021</a:t>
             </a:fld>
             <a:endParaRPr lang="en-US"/>
           </a:p>
@@ -7558,7 +7558,7 @@
             <a:fld id="{37EC93DC-A9AD-4A65-9F65-BBF7285F278B}" type="datetime1">
               <a:rPr lang="en-US" smtClean="0"/>
               <a:pPr/>
-              <a:t>12/30/2020</a:t>
+              <a:t>4/23/2021</a:t>
             </a:fld>
             <a:endParaRPr lang="en-US"/>
           </a:p>

</xml_diff>

<commit_message>
Fixed bibliography and citation style
</commit_message>
<xml_diff>
--- a/Presentation/Stage_1/stage_1_report_ppt.pptx
+++ b/Presentation/Stage_1/stage_1_report_ppt.pptx
@@ -3833,7 +3833,7 @@
         <p:spPr>
           <a:xfrm>
             <a:off x="646922" y="4038600"/>
-            <a:ext cx="2667000" cy="1692771"/>
+            <a:ext cx="4382278" cy="1692771"/>
           </a:xfrm>
           <a:prstGeom prst="rect">
             <a:avLst/>
@@ -3862,17 +3862,13 @@
                 <a:effectLst/>
                 <a:cs typeface="Times New Roman" panose="02020603050405020304" pitchFamily="18" charset="0"/>
               </a:rPr>
-              <a:t>Shreyas </a:t>
-            </a:r>
-            <a:r>
-              <a:rPr lang="en-IN" sz="2000" b="0" i="0" u="none" strike="noStrike" dirty="0" err="1">
-                <a:solidFill>
-                  <a:srgbClr val="000000"/>
-                </a:solidFill>
-                <a:effectLst/>
-                <a:cs typeface="Times New Roman" panose="02020603050405020304" pitchFamily="18" charset="0"/>
+              <a:t>Shreyas Kalvankar	</a:t>
+            </a:r>
+            <a:r>
+              <a:rPr lang="en-US" sz="1800" b="0" i="0" u="none" strike="noStrike" baseline="0" dirty="0">
+                <a:latin typeface="NimbusRomNo9L-Regu"/>
               </a:rPr>
-              <a:t>Kalvankar</a:t>
+              <a:t>B150134261</a:t>
             </a:r>
             <a:r>
               <a:rPr lang="en-IN" sz="2000" dirty="0">
@@ -3881,7 +3877,7 @@
                 </a:solidFill>
                 <a:cs typeface="Times New Roman" panose="02020603050405020304" pitchFamily="18" charset="0"/>
               </a:rPr>
-              <a:t> - 17</a:t>
+              <a:t> </a:t>
             </a:r>
             <a:br>
               <a:rPr lang="en-IN" sz="2000" b="0" i="0" u="none" strike="noStrike" dirty="0">
@@ -3910,7 +3906,13 @@
                 <a:effectLst/>
                 <a:cs typeface="Times New Roman" panose="02020603050405020304" pitchFamily="18" charset="0"/>
               </a:rPr>
-              <a:t> Pandit - 18</a:t>
+              <a:t> Pandit	</a:t>
+            </a:r>
+            <a:r>
+              <a:rPr lang="en-US" sz="1800" b="0" i="0" u="none" strike="noStrike" baseline="0" dirty="0">
+                <a:latin typeface="NimbusRomNo9L-Regu"/>
+              </a:rPr>
+              <a:t>B150134296</a:t>
             </a:r>
             <a:br>
               <a:rPr lang="en-IN" sz="2000" b="0" i="0" u="none" strike="noStrike" dirty="0">
@@ -3929,10 +3931,18 @@
                 <a:effectLst/>
                 <a:cs typeface="Times New Roman" panose="02020603050405020304" pitchFamily="18" charset="0"/>
               </a:rPr>
-              <a:t>Pranav Parwate - 19</a:t>
-            </a:r>
-          </a:p>
-          <a:p>
+              <a:t>Pranav </a:t>
+            </a:r>
+            <a:r>
+              <a:rPr lang="en-IN" sz="2000" b="0" i="0" u="none" strike="noStrike" dirty="0" err="1">
+                <a:solidFill>
+                  <a:srgbClr val="000000"/>
+                </a:solidFill>
+                <a:effectLst/>
+                <a:cs typeface="Times New Roman" panose="02020603050405020304" pitchFamily="18" charset="0"/>
+              </a:rPr>
+              <a:t>Parwate</a:t>
+            </a:r>
             <a:r>
               <a:rPr lang="en-IN" sz="2000" b="0" i="0" u="none" strike="noStrike" dirty="0">
                 <a:solidFill>
@@ -3941,7 +3951,38 @@
                 <a:effectLst/>
                 <a:cs typeface="Times New Roman" panose="02020603050405020304" pitchFamily="18" charset="0"/>
               </a:rPr>
-              <a:t>Atharva Patil - 20</a:t>
+              <a:t>		</a:t>
+            </a:r>
+            <a:r>
+              <a:rPr lang="en-US" sz="1800" b="0" i="0" u="none" strike="noStrike" baseline="0" dirty="0">
+                <a:latin typeface="NimbusRomNo9L-Regu"/>
+              </a:rPr>
+              <a:t>B150134299</a:t>
+            </a:r>
+            <a:endParaRPr lang="en-IN" sz="2000" b="0" i="0" u="none" strike="noStrike" dirty="0">
+              <a:solidFill>
+                <a:srgbClr val="000000"/>
+              </a:solidFill>
+              <a:effectLst/>
+              <a:cs typeface="Times New Roman" panose="02020603050405020304" pitchFamily="18" charset="0"/>
+            </a:endParaRPr>
+          </a:p>
+          <a:p>
+            <a:r>
+              <a:rPr lang="en-IN" sz="2000" b="0" i="0" u="none" strike="noStrike" dirty="0">
+                <a:solidFill>
+                  <a:srgbClr val="000000"/>
+                </a:solidFill>
+                <a:effectLst/>
+                <a:cs typeface="Times New Roman" panose="02020603050405020304" pitchFamily="18" charset="0"/>
+              </a:rPr>
+              <a:t>Atharva Patil		</a:t>
+            </a:r>
+            <a:r>
+              <a:rPr lang="en-US" sz="1800" b="0" i="0" u="none" strike="noStrike" baseline="0" dirty="0">
+                <a:latin typeface="NimbusRomNo9L-Regu"/>
+              </a:rPr>
+              <a:t>B150134303</a:t>
             </a:r>
             <a:endParaRPr lang="en-IN" sz="2000" dirty="0">
               <a:cs typeface="Times New Roman" panose="02020603050405020304" pitchFamily="18" charset="0"/>

</xml_diff>